<commit_message>
Add photo of Brown
</commit_message>
<xml_diff>
--- a/Session 06 - Polar Coordinates/Session 06 - Polar Coordinates.pptx
+++ b/Session 06 - Polar Coordinates/Session 06 - Polar Coordinates.pptx
@@ -23440,8 +23440,8 @@
           </a:p>
         </p:txBody>
       </p:sp>
-      <mc:AlternateContent xmlns:mc="http://schemas.openxmlformats.org/markup-compatibility/2006">
-        <mc:Choice xmlns:a14="http://schemas.microsoft.com/office/drawing/2010/main" Requires="a14">
+      <mc:AlternateContent xmlns:mc="http://schemas.openxmlformats.org/markup-compatibility/2006" xmlns:a14="http://schemas.microsoft.com/office/drawing/2010/main">
+        <mc:Choice Requires="a14">
           <p:sp>
             <p:nvSpPr>
               <p:cNvPr id="3" name="Content Placeholder 2">
@@ -23597,7 +23597,7 @@
             </p:txBody>
           </p:sp>
         </mc:Choice>
-        <mc:Fallback>
+        <mc:Fallback xmlns="">
           <p:sp>
             <p:nvSpPr>
               <p:cNvPr id="3" name="Content Placeholder 2">
@@ -26379,8 +26379,8 @@
           </a:p>
         </p:txBody>
       </p:sp>
-      <mc:AlternateContent xmlns:mc="http://schemas.openxmlformats.org/markup-compatibility/2006">
-        <mc:Choice xmlns:a14="http://schemas.microsoft.com/office/drawing/2010/main" Requires="a14">
+      <mc:AlternateContent xmlns:mc="http://schemas.openxmlformats.org/markup-compatibility/2006" xmlns:a14="http://schemas.microsoft.com/office/drawing/2010/main">
+        <mc:Choice Requires="a14">
           <p:sp>
             <p:nvSpPr>
               <p:cNvPr id="44" name="TextBox 43">
@@ -26457,7 +26457,7 @@
             </p:txBody>
           </p:sp>
         </mc:Choice>
-        <mc:Fallback>
+        <mc:Fallback xmlns="">
           <p:sp>
             <p:nvSpPr>
               <p:cNvPr id="44" name="TextBox 43">
@@ -27005,6 +27005,181 @@
           </a:prstGeom>
         </p:spPr>
       </p:pic>
+      <p:grpSp>
+        <p:nvGrpSpPr>
+          <p:cNvPr id="10" name="Group 9">
+            <a:extLst>
+              <a:ext uri="{FF2B5EF4-FFF2-40B4-BE49-F238E27FC236}">
+                <a16:creationId xmlns:a16="http://schemas.microsoft.com/office/drawing/2014/main" id="{12BE3B9B-2D5D-9C5F-1220-F8D6C6913A56}"/>
+              </a:ext>
+            </a:extLst>
+          </p:cNvPr>
+          <p:cNvGrpSpPr/>
+          <p:nvPr/>
+        </p:nvGrpSpPr>
+        <p:grpSpPr>
+          <a:xfrm>
+            <a:off x="142407" y="438462"/>
+            <a:ext cx="1979911" cy="3110459"/>
+            <a:chOff x="6857999" y="562131"/>
+            <a:chExt cx="1979911" cy="3110459"/>
+          </a:xfrm>
+        </p:grpSpPr>
+        <p:sp>
+          <p:nvSpPr>
+            <p:cNvPr id="6" name="Rectangle 5">
+              <a:extLst>
+                <a:ext uri="{FF2B5EF4-FFF2-40B4-BE49-F238E27FC236}">
+                  <a16:creationId xmlns:a16="http://schemas.microsoft.com/office/drawing/2014/main" id="{20C6901C-158F-4D04-589A-870286B6A520}"/>
+                </a:ext>
+              </a:extLst>
+            </p:cNvPr>
+            <p:cNvSpPr/>
+            <p:nvPr/>
+          </p:nvSpPr>
+          <p:spPr>
+            <a:xfrm>
+              <a:off x="6857999" y="562131"/>
+              <a:ext cx="1979911" cy="3110459"/>
+            </a:xfrm>
+            <a:prstGeom prst="rect">
+              <a:avLst/>
+            </a:prstGeom>
+            <a:solidFill>
+              <a:schemeClr val="bg1"/>
+            </a:solidFill>
+            <a:ln>
+              <a:noFill/>
+            </a:ln>
+          </p:spPr>
+          <p:style>
+            <a:lnRef idx="2">
+              <a:schemeClr val="accent1">
+                <a:shade val="15000"/>
+              </a:schemeClr>
+            </a:lnRef>
+            <a:fillRef idx="1">
+              <a:schemeClr val="accent1"/>
+            </a:fillRef>
+            <a:effectRef idx="0">
+              <a:schemeClr val="accent1"/>
+            </a:effectRef>
+            <a:fontRef idx="minor">
+              <a:schemeClr val="lt1"/>
+            </a:fontRef>
+          </p:style>
+          <p:txBody>
+            <a:bodyPr rtlCol="0" anchor="ctr"/>
+            <a:lstStyle/>
+            <a:p>
+              <a:pPr algn="ctr"/>
+              <a:endParaRPr lang="en-US"/>
+            </a:p>
+          </p:txBody>
+        </p:sp>
+        <p:grpSp>
+          <p:nvGrpSpPr>
+            <p:cNvPr id="9" name="Group 8">
+              <a:extLst>
+                <a:ext uri="{FF2B5EF4-FFF2-40B4-BE49-F238E27FC236}">
+                  <a16:creationId xmlns:a16="http://schemas.microsoft.com/office/drawing/2014/main" id="{BB6A03C1-4A7E-F7F7-DC77-A89D7E0F7BA0}"/>
+                </a:ext>
+              </a:extLst>
+            </p:cNvPr>
+            <p:cNvGrpSpPr/>
+            <p:nvPr/>
+          </p:nvGrpSpPr>
+          <p:grpSpPr>
+            <a:xfrm>
+              <a:off x="7083457" y="651879"/>
+              <a:ext cx="1528996" cy="2736090"/>
+              <a:chOff x="7308915" y="556922"/>
+              <a:chExt cx="1528996" cy="2736090"/>
+            </a:xfrm>
+          </p:grpSpPr>
+          <p:pic>
+            <p:nvPicPr>
+              <p:cNvPr id="3" name="Picture 2">
+                <a:extLst>
+                  <a:ext uri="{FF2B5EF4-FFF2-40B4-BE49-F238E27FC236}">
+                    <a16:creationId xmlns:a16="http://schemas.microsoft.com/office/drawing/2014/main" id="{73142350-5A77-6F86-FA99-08289EF8D3E0}"/>
+                  </a:ext>
+                </a:extLst>
+              </p:cNvPr>
+              <p:cNvPicPr>
+                <a:picLocks noChangeAspect="1"/>
+              </p:cNvPicPr>
+              <p:nvPr/>
+            </p:nvPicPr>
+            <p:blipFill>
+              <a:blip r:embed="rId3"/>
+              <a:stretch>
+                <a:fillRect/>
+              </a:stretch>
+            </p:blipFill>
+            <p:spPr>
+              <a:xfrm>
+                <a:off x="7372370" y="556922"/>
+                <a:ext cx="1402087" cy="2119625"/>
+              </a:xfrm>
+              <a:prstGeom prst="rect">
+                <a:avLst/>
+              </a:prstGeom>
+              <a:ln>
+                <a:noFill/>
+              </a:ln>
+            </p:spPr>
+          </p:pic>
+          <p:sp>
+            <p:nvSpPr>
+              <p:cNvPr id="5" name="TextBox 4">
+                <a:extLst>
+                  <a:ext uri="{FF2B5EF4-FFF2-40B4-BE49-F238E27FC236}">
+                    <a16:creationId xmlns:a16="http://schemas.microsoft.com/office/drawing/2014/main" id="{601D94C3-56AC-09DC-968E-6DFDA93B68B5}"/>
+                  </a:ext>
+                </a:extLst>
+              </p:cNvPr>
+              <p:cNvSpPr txBox="1"/>
+              <p:nvPr/>
+            </p:nvSpPr>
+            <p:spPr>
+              <a:xfrm>
+                <a:off x="7308915" y="2739014"/>
+                <a:ext cx="1528996" cy="553998"/>
+              </a:xfrm>
+              <a:prstGeom prst="rect">
+                <a:avLst/>
+              </a:prstGeom>
+              <a:solidFill>
+                <a:schemeClr val="bg1"/>
+              </a:solidFill>
+              <a:ln>
+                <a:noFill/>
+              </a:ln>
+            </p:spPr>
+            <p:txBody>
+              <a:bodyPr wrap="square" rtlCol="0">
+                <a:spAutoFit/>
+              </a:bodyPr>
+              <a:lstStyle/>
+              <a:p>
+                <a:pPr algn="ctr"/>
+                <a:r>
+                  <a:rPr lang="en-US" sz="1600" b="1" dirty="0"/>
+                  <a:t>Robert Brown</a:t>
+                </a:r>
+              </a:p>
+              <a:p>
+                <a:pPr algn="ctr"/>
+                <a:r>
+                  <a:rPr lang="en-US" sz="1400" dirty="0"/>
+                  <a:t>(1773 – 1858)</a:t>
+                </a:r>
+              </a:p>
+            </p:txBody>
+          </p:sp>
+        </p:grpSp>
+      </p:grpSp>
     </p:spTree>
     <p:extLst>
       <p:ext uri="{BB962C8B-B14F-4D97-AF65-F5344CB8AC3E}">

</xml_diff>